<commit_message>
Added Present Pdf File
</commit_message>
<xml_diff>
--- a/NLP243/Projects/EA_MT.pptx
+++ b/NLP243/Projects/EA_MT.pptx
@@ -23907,7 +23907,7 @@
               <a:buAutoNum type="arabicPeriod"/>
             </a:pPr>
             <a:r>
-              <a:rPr lang="en-US" altLang="zh-TW" dirty="0" err="1">
+              <a:rPr lang="en-US" altLang="zh-TW" b="1" dirty="0" err="1">
                 <a:latin typeface="Times New Roman" panose="02020603050405020304" pitchFamily="18" charset="0"/>
                 <a:cs typeface="Times New Roman" panose="02020603050405020304" pitchFamily="18" charset="0"/>
               </a:rPr>
@@ -32819,7 +32819,7 @@
                 <a:latin typeface="Times New Roman" panose="02020603050405020304" pitchFamily="18" charset="0"/>
                 <a:cs typeface="Times New Roman" panose="02020603050405020304" pitchFamily="18" charset="0"/>
               </a:rPr>
-              <a:t>These will cause inaccuracies in transla</a:t>
+              <a:t>These will cause inaccuracies in transl</a:t>
             </a:r>
             <a:r>
               <a:rPr lang="en-US" altLang="zh-TW" sz="3200" dirty="0">

</xml_diff>